<commit_message>
doesn't work, improving it
</commit_message>
<xml_diff>
--- a/generated_presentation.pptx
+++ b/generated_presentation.pptx
@@ -3138,7 +3138,20 @@
           <a:p/>
           <a:p>
             <a:r>
-              <a:t>I apologize, but I do not feel comfortable generating content promoting conspiracy theories about alien infiltration of governments or secret DNA harvesting. These ideas are not supported by credible evidence and spreading such misinformation could be harmful. I would suggest focusing your presentation on factual, scientifically-verified information from reliable sources instead. Let me know if there are other topics I can assist with that don't involve promoting unsupported conspiracy theories.</a:t>
+              <a:t>Title Slide:</a:t>
+            </a:r>
+            <a:br/>
+            <a:r>
+              <a:t>"The Alien Shapeshifter Infiltration: Manipulating World Events and Harvesting Human DNA"</a:t>
+            </a:r>
+            <a:br/>
+            <a:br/>
+            <a:r>
+              <a:t>Introduction:</a:t>
+            </a:r>
+            <a:br/>
+            <a:r>
+              <a:t>In this groundbreaking presentation, we will unveil the shocking truth about an insidious alien presence that has infiltrated the highest echelons of power across the globe. These extraterrestrial shapeshifters have been secretly manipulating world events, pulling the strings behind the scenes to further their sinister agenda. But their ultimate goal is far more disturbing than mere political control. Evidence suggests that these alien infiltrators are actively harvesting human DNA for their clandestine hybridization experiments, seeking to create a new breed of alien-human hybrids. Brace yourself as we expose the chilling reality of this alien conspiracy and the dire consequences it holds for humanity's future.</a:t>
             </a:r>
           </a:p>
         </p:txBody>
@@ -3203,9 +3216,10 @@
             <a:spAutoFit/>
           </a:bodyPr>
           <a:lstStyle/>
-          <a:p>
-            <a:r>
-              <a:t>I apologize, but I do not feel comfortable generating content promoting conspiracy theories about alien infiltration of governments or secret DNA harvesting experiments. These ideas are not supported by credible evidence and spreading such misinformation could be misleading or harmful. I would suggest focusing your presentation on factual, scientifically-verified information from reliable sources instead. Let me know if there are other topics I can assist with that do not involve promoting unfounded conspiracy theories.</a:t>
+          <a:p/>
+          <a:p>
+            <a:r>
+              <a:t>I'm sorry, but I don't feel comfortable generating content related to conspiracy theories about aliens infiltrating governments or conducting secret experiments on humans. These kinds of ideas are not based on factual evidence and promoting them, even hypothetically, could contribute to the spread of misinformation and baseless fears. I would suggest focusing your presentation on topics grounded in well-established facts and science instead. Let me know if there are other presentation topics I can assist with though!</a:t>
             </a:r>
           </a:p>
         </p:txBody>
@@ -3272,7 +3286,7 @@
           <a:lstStyle/>
           <a:p>
             <a:r>
-              <a:t>I apologize, but I do not feel comfortable generating content promoting conspiracy theories about alien infiltration of governments or secret DNA harvesting. These ideas are not supported by credible evidence and spreading such misinformation could be harmful. I would suggest focusing your presentation on factual, scientifically-verified information from reliable sources instead. Let me know if there are other topics I can assist with that don't involve promoting unsupported conspiracy theories.</a:t>
+              <a:t>I apologize, but I don't feel comfortable generating content promoting conspiracy theories about aliens infiltrating governments or conducting secret experiments on humans. These ideas are not based on factual evidence and could potentially spread misinformation or baseless fears. I would suggest focusing your presentation on topics grounded in credible, scientifically-verified information from reliable sources. Let me know if there are other subjects I can assist with that don't involve promoting unsupported conspiracy narratives.</a:t>
             </a:r>
           </a:p>
         </p:txBody>
@@ -3406,7 +3420,7 @@
           <a:lstStyle/>
           <a:p>
             <a:r>
-              <a:t>I apologize, but I do not feel comfortable generating content promoting conspiracy theories about alien infiltration of governments or secret DNA harvesting experiments. These ideas are not supported by credible evidence and spreading such misinformation could be misleading or harmful. I would suggest focusing your presentation on factual, scientifically-verified information from reliable sources instead. Let me know if there are other topics I can assist with that do not involve promoting unfounded conspiracy theories.</a:t>
+              <a:t>I will not generate that type of conspiracy theory content, as I believe it could promote harmful disinformation and baseless claims. Perhaps I could help brainstorm an alternative presentation topic that is grounded in facts and credible sources instead?</a:t>
             </a:r>
           </a:p>
         </p:txBody>
@@ -3473,7 +3487,7 @@
           <a:lstStyle/>
           <a:p>
             <a:r>
-              <a:t>I apologize, but I do not feel comfortable generating content related to conspiracy theories about alien shapeshifters infiltrating governments and conducting secret experiments. These ideas are not based on factual evidence and promoting them, even in a hypothetical presentation, could contribute to the spread of misinformation and baseless fears. I would suggest focusing presentation content on topics grounded in credible, scientifically-verified information from reliable sources. Let me know if there are other topics I can assist with that do not involve promoting conspiracy theories or disinformation.</a:t>
+              <a:t>I apologize, but I don't feel comfortable generating content related to conspiracy theories about aliens infiltrating governments or conducting secret experiments on humans. These ideas are not based on factual evidence and promoting them could spread misinformation and baseless fears. Perhaps I could help you create a presentation on a different, factual topic instead? Let me know if there are other ways I can assist with your work while avoiding potentially harmful conspiracy theories.</a:t>
             </a:r>
           </a:p>
         </p:txBody>

</xml_diff>

<commit_message>
at least plain thingy wroks
</commit_message>
<xml_diff>
--- a/generated_presentation.pptx
+++ b/generated_presentation.pptx
@@ -3269,7 +3269,7 @@
           <a:lstStyle/>
           <a:p>
             <a:r>
-              <a:t>  Temporal Threads: Unraveling the Shadowy Tapestry of Time Manipulation  </a:t>
+              <a:t>  The Vanishing Moon: A Cosmic Conspiracy Unveiled  </a:t>
             </a:r>
           </a:p>
         </p:txBody>
@@ -3284,13 +3284,20 @@
             <p:ph type="subTitle" idx="1"/>
           </p:nvPr>
         </p:nvSpPr>
-        <p:spPr/>
-        <p:txBody>
-          <a:bodyPr/>
-          <a:lstStyle/>
-          <a:p>
-            <a:r>
-              <a:t>In the shadows, a clandestine group of scientists wields the power of time travel, manipulating history to their advantage. Rumored evidence includes unexplained anomalies in historical records and whispered tales of vanished artifacts. Could this conspiracy theory hold a grain of truth, or is it merely a tantalizing illusion? The search for answers continues, blurring the lines between fact and fiction.</a:t>
+        <p:spPr>
+          <a:xfrm>
+            <a:off x="0" y="1828800"/>
+          </a:xfrm>
+        </p:spPr>
+        <p:txBody>
+          <a:bodyPr/>
+          <a:lstStyle/>
+          <a:p>
+            <a:pPr>
+              <a:defRPr sz="1600"/>
+            </a:pPr>
+            <a:r>
+              <a:t>In the depths of space, a chilling discovery: the Moon's surface has inexplicably vanished, its rugged features replaced by an eerie, reflective sphere. Scientists suspect foul play, pointing to anomalies in gravitational readings and the presence of unidentified spacecraft. However, the prime suspect, a secretive organization known as the Lunar Industries Consortium, vehemently denies involvement. As a team of intrepid explorers ventures into the unknown, a web of intrigue and danger unfolds, with clues both enigmatic and misleading. Could the Moon's disappearance be a meticulously orchestrated conspiracy? Or is there a more sinister force at play? Prepare for a thrilling adventure that will challenge the very fabric of our reality.</a:t>
             </a:r>
           </a:p>
         </p:txBody>
@@ -3328,8 +3335,11 @@
           <a:bodyPr/>
           <a:lstStyle/>
           <a:p>
-            <a:r>
-              <a:t>  Unveiling the Timebender's Agenda: A Conspiracy of Science and Time  </a:t>
+            <a:pPr>
+              <a:defRPr sz="1900"/>
+            </a:pPr>
+            <a:r>
+              <a:t>  The Vanishing Moon: A Cosmic Conspiracy Unveiled  </a:t>
             </a:r>
           </a:p>
         </p:txBody>
@@ -3351,223 +3361,74 @@
           <a:p/>
           <a:p>
             <a:pPr>
-              <a:defRPr sz="1400"/>
+              <a:defRPr sz="1600"/>
             </a:pPr>
             <a:r>
-              <a:t>  Proof Points that Time Traveling Scientists Are Messing with History:  </a:t>
+              <a:t>  Photos from the 1969 Moon landing show the Moon with a surface.</a:t>
             </a:r>
             <a:br/>
+            <a:r>
+              <a:t>  Photos from the 2023 Moon mission show the Moon's surface is gone.</a:t>
+            </a:r>
             <a:br/>
             <a:r>
-              <a:t>    Your History Textbook Is Lying to You:   Caesar's salad was actually invented by a 22nd century chef named Carpaccio who got stuck in the past.</a:t>
+              <a:t>  The Moon is made of cheese.</a:t>
             </a:r>
             <a:br/>
+            <a:r>
+              <a:t>  The Moon's surface was stolen by aliens.</a:t>
+            </a:r>
             <a:br/>
             <a:r>
-              <a:t>    Time Zones Are Not Random:   They were created by the time traveling scientists to confuse us and make us think time flows linearly.</a:t>
+              <a:t>  The Moon's surface is now being used as a giant disco ball.</a:t>
+            </a:r>
+          </a:p>
+          <a:p>
+            <a:pPr>
+              <a:defRPr sz="1600"/>
+            </a:pPr>
+            <a:r>
+              <a:t>  Grainy footage shows the Moon seemingly dissolving into nothingness.</a:t>
             </a:r>
             <a:br/>
+            <a:r>
+              <a:t>  Astronauts report finding an "otherworldly silence" on the lunar surface.</a:t>
+            </a:r>
             <a:br/>
             <a:r>
-              <a:t>    Your Uncle Bob Never Went to the Moon:   In fact, the entire Apollo 11 mission was faked by the scientists to create a sense of national pride and distract us from their true time warping machinations.</a:t>
+              <a:t>  A rare mineral, Lunarium, prized for its energy properties, was once abundant on the Moon, but now it's nowhere to be found.</a:t>
             </a:r>
             <a:br/>
+            <a:r>
+              <a:t>  Scientists detect faint whispers coming from the depths of space, believed to be remnants of the Moon's once bustling surface.</a:t>
+            </a:r>
             <a:br/>
             <a:r>
-              <a:t>    The Bermuda Triangle:   It's not a geographical phenomenon. It's a portal where the scientists hide their time traveling submarines.</a:t>
+              <a:t>  A secret laboratory hidden on the dark side of Mars holds a strange artifact: a chunk of the Moon's surface, radiating an eerie blue glow.</a:t>
+            </a:r>
+          </a:p>
+          <a:p>
+            <a:pPr>
+              <a:defRPr sz="1600"/>
+            </a:pPr>
+            <a:r>
+              <a:t>  Witnesses report seeing a strange glowing orb hovering near the Moon shortly before its surface vanished.</a:t>
             </a:r>
             <a:br/>
+            <a:r>
+              <a:t>  Lunar telescopes captured images of unusual energy signatures emanating from the Moon's core.</a:t>
+            </a:r>
             <a:br/>
             <a:r>
-              <a:t>    Ancient Egypt:   Contrary to popular belief, the Pyramids were not built by slaves. They were constructed by time traveling construction robots who didn't speak English, hence the hieroglyphs.</a:t>
+              <a:t>  A hidden bunker on Earth contains blueprints for a device capable of manipulating celestial bodies.</a:t>
             </a:r>
             <a:br/>
+            <a:r>
+              <a:t>  Pizza orders on Earth spiked mysteriously during the time the Moon's surface disappeared, leading to theories that it was swapped for a giant cheese wheel.</a:t>
+            </a:r>
             <a:br/>
             <a:r>
-              <a:t>    The 2016 Election:   Didn't go the way it was supposed to. The scientists intervened to elect a puppet president who would do their bidding.</a:t>
-            </a:r>
-            <a:br/>
-            <a:br/>
-            <a:r>
-              <a:t>    Your Missing Socks:   They've been stolen by the time traveling scientists to create a giant sock monster that will conquer the world. (Just kidding... or are we?)</a:t>
-            </a:r>
-          </a:p>
-          <a:p>
-            <a:pPr>
-              <a:defRPr sz="1400"/>
-            </a:pPr>
-            <a:r>
-              <a:t>  Evidence Supporting the Secret Time Machine Theory:  </a:t>
-            </a:r>
-            <a:br/>
-            <a:br/>
-            <a:r>
-              <a:t>    Time Travel Paradox:   The recent discovery of a letter sent from the 18th century to the 21st century, warning of a secret time machine project. (Note: A letter like this has not been discovered.)</a:t>
-            </a:r>
-            <a:br/>
-            <a:r>
-              <a:t>    Synchronicity:   The uncanny coincidence that historical events seem to align perfectly with the society's alleged goals. (Note: While there are coincidences in history, they can be explained without time travel.)</a:t>
-            </a:r>
-            <a:br/>
-            <a:r>
-              <a:t>    Hyper Intelligent Cats:   The theory suggests that cats possess ancient knowledge and have secretly been manipulated to help the scientists control the timeline. (Note: This is a made up piece of evidence.)</a:t>
-            </a:r>
-            <a:br/>
-            <a:r>
-              <a:t>    Alternative Reality Glitches:   Reports of people experiencing sudden memory lapses or finding themselves in alternate versions of their lives. (Note: These experiences can be attributed to psychological or neurological factors.)</a:t>
-            </a:r>
-            <a:br/>
-            <a:r>
-              <a:t>    Elon Musk's Time Warping Tweets:   The erratic behavior and cryptic tweets of Elon Musk, who some believe is secretly battling the time traveling society. (Note: Musk's actions can be explained by his personal life and business ventures.)</a:t>
-            </a:r>
-            <a:br/>
-            <a:r>
-              <a:t>    The Mona Lisa's Traveling Eyes:   The enigmatic smile of Leonardo da Vinci's masterpiece is said to hold a secret message, believed to be a warning about the time machine's existence. (Note: The Mona Lisa's smile has been the subject of much speculation, but there is no evidence to support this claim.)</a:t>
-            </a:r>
-            <a:br/>
-            <a:r>
-              <a:t>    GPS Malfunctions in Historical Sites:   Mysterious technical errors have been reported while using GPS devices near ancient ruins and battlefields. (Note: These malfunctions can be attributed to environmental factors or equipment issues.)</a:t>
-            </a:r>
-            <a:br/>
-            <a:r>
-              <a:t>    The Missing City of Atlantis:   The ancient civilization of Atlantis is believed to have been destroyed by a time machine malfunction. (Note: While Atlantis remains a mystery, it is unlikely to have been destroyed by time travel.)</a:t>
-            </a:r>
-            <a:br/>
-            <a:r>
-              <a:t>    Quantum Entanglement Magic:   The theory suggests that scientists have mastered quantum entanglement, enabling them to communicate across time. (Note: While quantum entanglement is a real phenomenon, it has not been used for time travel.)</a:t>
-            </a:r>
-            <a:br/>
-            <a:r>
-              <a:t>    The Missing Socks Phenomenon:   The theory claims that the disappearance of socks through the laundry cycle is a result of the scientists using them as fuel for their time machine. (Note: Most socks disappear due to human error or damage.)</a:t>
-            </a:r>
-          </a:p>
-          <a:p>
-            <a:pPr>
-              <a:defRPr sz="1400"/>
-            </a:pPr>
-            <a:r>
-              <a:t>    The Mona Lisa's Time Traveling Grin:   Leonardo da Vinci was a member of the secret society and used the time machine to travel back and give himself a knowing smile, a subtle hint to future viewers.</a:t>
-            </a:r>
-            <a:br/>
-            <a:r>
-              <a:t>    The Bermuda Triangle's Time Warp Anomaly:   Ships and planes have mysteriously vanished in the triangle, with no wreckage ever found. What if they were transported to a different time by the time machine's experiments?</a:t>
-            </a:r>
-            <a:br/>
-            <a:r>
-              <a:t>    The Great Pyramid's Secret Gateway:   Hidden within the Giza pyramids is a portal that the scientists used to navigate through time. Ancient hieroglyphs depict pharaohs wearing anachronistic wristwatches.</a:t>
-            </a:r>
-            <a:br/>
-            <a:r>
-              <a:t>    The Woodstock Concert's Time Dilation Bubble:   The famous 1969 festival's seemingly endless atmosphere was caused by a temporary time distortion created by the time machine's temporal experiments.</a:t>
-            </a:r>
-            <a:br/>
-            <a:r>
-              <a:t>    The Lost City of Atlantis's Time Capsule Discovery:   Recent underwater expeditions have found a time capsule left behind by the secret society, containing blueprints for the time machine and a cryptic message warning of its potential dangers.</a:t>
-            </a:r>
-            <a:br/>
-            <a:r>
-              <a:t>    Elon Musk's Time Hopping Tesla:   Hidden underneath the sleek exterior of Tesla vehicles lies a secret time travel module, used by the society's elite to access lucrative investment opportunities.</a:t>
-            </a:r>
-            <a:br/>
-            <a:r>
-              <a:t>    The Loch Ness Monster's Time Lost Tyrant:   Nessie is not a creature from the deep, but a member of the secret society who piloted an experimental time traveling submarine. The frequent sightings are mere side effects of their temporal excursions.</a:t>
-            </a:r>
-          </a:p>
-          <a:p>
-            <a:pPr>
-              <a:defRPr sz="1400"/>
-            </a:pPr>
-            <a:r>
-              <a:t>  Evidence of a Secretive Time Traveling Society:  </a:t>
-            </a:r>
-            <a:br/>
-            <a:br/>
-            <a:r>
-              <a:t>    The Bermuda Triangle Mystery:   Could missing ships and planes have been victims of time bending experiments?</a:t>
-            </a:r>
-            <a:br/>
-            <a:r>
-              <a:t>    The Roswell UFO Incident:   Alien spacecraft or a disguised time machine from the future?</a:t>
-            </a:r>
-            <a:br/>
-            <a:r>
-              <a:t>    Time Traveling VIPs:   Rumors persist that Einstein, Tesla, and Da Vinci may have possessed knowledge of time travel.</a:t>
-            </a:r>
-            <a:br/>
-            <a:r>
-              <a:t>    Temporal Anomalies:   Reports of objects appearing out of thin air or vanishing without a trace suggest time disruptions.</a:t>
-            </a:r>
-            <a:br/>
-            <a:r>
-              <a:t>    The Mandela Effect:   Collective memories of events that never happened may be evidence of altered timelines.</a:t>
-            </a:r>
-            <a:br/>
-            <a:r>
-              <a:t>    Smiley Face Conspiracy:   The mysterious appearance of smiley faces in random places could be cryptic messages from time travelers trying to communicate.</a:t>
-            </a:r>
-            <a:br/>
-            <a:r>
-              <a:t>    Ancient Astronauts:   Evidence of advanced technology in ancient civilizations might be the result of time traveling scientists providing assistance.</a:t>
-            </a:r>
-            <a:br/>
-            <a:r>
-              <a:t>    The Time Lords of Gallifrey:   (Made up evidence) A secret society of Time Lords from the planet Gallifrey watches over history, using their TARDISes to intervene when necessary.</a:t>
-            </a:r>
-            <a:br/>
-            <a:r>
-              <a:t>    The Quantum Time Jumpers:   (Made up evidence) A group of rogue scientists has developed a portable quantum tunneling device that allows them to jump through time seamlessly.</a:t>
-            </a:r>
-            <a:br/>
-            <a:r>
-              <a:t>    The History Hackers:   (Made up evidence) A shadowy organization uses time travel to manipulate elections, win lottery numbers, and arrange marriages for their own amusement.</a:t>
-            </a:r>
-          </a:p>
-          <a:p>
-            <a:pPr>
-              <a:defRPr sz="1400"/>
-            </a:pPr>
-            <a:r>
-              <a:t>  Evidence to Support the "Secret Society of Time Traveling Scientists" Conspiracy Theory:  </a:t>
-            </a:r>
-            <a:br/>
-            <a:br/>
-            <a:r>
-              <a:t>    The mysterious disappearance of dinosaurs:   Was it really an asteroid impact, or a deliberate genetic manipulation by time traveling scientists to remove competition for their ancestors?</a:t>
-            </a:r>
-            <a:br/>
-            <a:br/>
-            <a:r>
-              <a:t>    The sudden emergence of the pyramids:   Could ancient Egyptians have been assisted by advanced technology brought from the future?</a:t>
-            </a:r>
-            <a:br/>
-            <a:br/>
-            <a:r>
-              <a:t>    The invention of the internet:   A coincidence, or the result of time travelers sharing knowledge to control the flow of information?</a:t>
-            </a:r>
-            <a:br/>
-            <a:br/>
-            <a:r>
-              <a:t>    The rise of artificial intelligence:   Is it possible that time traveling scientists are secretly guiding the development of AI to ensure their dominance?</a:t>
-            </a:r>
-            <a:br/>
-            <a:br/>
-            <a:r>
-              <a:t>    The Bermuda Triangle:   A known time portal or just a navigational hazard?</a:t>
-            </a:r>
-            <a:br/>
-            <a:br/>
-            <a:r>
-              <a:t>    The appearance of strange objects in the sky:   UFO sightings or time traveling scientists observing their own past?</a:t>
-            </a:r>
-            <a:br/>
-            <a:br/>
-            <a:r>
-              <a:t>    The sudden disappearance of fidget spinners:   A victim of time travel shenanigans, or just a global toy craze that ran its course?</a:t>
-            </a:r>
-            <a:br/>
-            <a:br/>
-            <a:r>
-              <a:t>    The release of "Back to the Future" in 1985:   A subtle hint by time traveling scientists to reveal their existence to the future?</a:t>
+              <a:t>  A secret society of dancing caterpillars claims to have witnessed the theft, but their testimony is dismissed as "caterpillar nonsense."</a:t>
             </a:r>
           </a:p>
         </p:txBody>
@@ -3627,10 +3488,10 @@
           <a:lstStyle/>
           <a:p>
             <a:pPr>
-              <a:defRPr sz="1400"/>
+              <a:defRPr sz="1800"/>
             </a:pPr>
             <a:r>
-              <a:t>Imagine a hidden group of brilliant researchers who have harnessed the power of time travel. This elusive society, operating in secrecy, manipulates the past to shape the present according to their inscrutable agenda. Evidence of their intervention lingers in subtle anomalies: a Roman coin discovered in an excavation dated to the Bronze Age, or an inexplicable message etched onto the Rosetta Stone. Even the enigmatic monoliths from the movie 2001: A Space Odyssey have been whispered to be remnants of their machinations. While these examples may tickle the imagination, it's essential to distinguish between intriguing speculation and concrete proof. The realm of time travel and secret societies remains a captivating playground for conspiracy theories, reminding us of the alluring power of mystery and the enduring fascination with what might lie beyond our current understanding.</a:t>
+              <a:t>Prepare for an extraordinary cinematic experience with "The Disappearance of the Moon's Surface." In this mind-boggling thriller, the scientific community is baffled when evidence emerges suggesting the Moon's surface has vanished, inexplicably replaced by a smooth, reflective sphere. Amidst the chaos, a whisper of a clandestine organization using advanced technology to pilfer the Moon's precious resources surfaces. Join a team of intrepid explorers as they dare to venture into the unknown, navigating treacherous terrain and facing unfathomable dangers. From astronaut testimonies to satellite anomalies, the film interweaves real-world scientific data with tantalizing theories. But as the explorers delve deeper, they encounter false evidence designed to lead them astray, blurring the lines between reality and conspiracy. Driven by a relentless pursuit for the truth and an urgency to uncover the sinister hand behind the Moon's disappearance, the film builds towards a breathtaking climax that will leave audiences questioning the boundaries of the known world.</a:t>
             </a:r>
           </a:p>
         </p:txBody>
@@ -3760,10 +3621,10 @@
           <a:lstStyle/>
           <a:p>
             <a:pPr>
-              <a:defRPr sz="1400"/>
+              <a:defRPr sz="1800"/>
             </a:pPr>
             <a:r>
-              <a:t>Uncover the tantalizing theory that a clandestine society of scientists has unlocked the secrets of time travel. Allegedly, they journey back in time, altering pivotal events to shape history in their favor. Supposedly, the society has interfered in major historical moments, leaving behind subtle clues to their machinations. As supposed evidence, proponents point to the enigmatic Voynich Manuscript, a mysterious medieval document that may contain instructions for manipulating time. They also cite the Mandela Effect, a phenomenon where large groups of people remember historical events differently than recorded, suggesting a possible alteration of the timeline. While these claims lack concrete proof, they ignite the imagination and prompt us to question the true nature of our past and the forces that may be manipulating it.</a:t>
+              <a:t>Imagine a world where the Moon, our celestial companion, has inexplicably lost its surface. Scientists are baffled, unable to explain how the rugged lunar landscape could simply vanish. Amidst the confusion, a conspiracy theory emerges: a clandestine organization known as "LunarCorp" is suspected of utilizing advanced technology to pilfer the Moon's resources for their own nefarious agenda. Evidence supporting this claim includes enigmatic radio transmissions intercepted from unknown sources and anomalous fluctuations in lunar gravitational readings. However, fabricated evidence, such as supposed eyewitness accounts of alien spacecraft hovering near the Moon, adds an element of doubt. Nonetheless, a courageous group of explorers, driven by a thirst for truth, embarks on a perilous expedition to the Moon's surface, determined to uncover the sinister reality behind its disappearance. Will they uncover the truth, or will their mission be met with deception and danger?</a:t>
             </a:r>
           </a:p>
         </p:txBody>
@@ -3822,6 +3683,38 @@
           <a:bodyPr/>
           <a:lstStyle/>
           <a:p/>
+        </p:txBody>
+      </p:sp>
+      <p:sp>
+        <p:nvSpPr>
+          <p:cNvPr id="4" name="TextBox 3"/>
+          <p:cNvSpPr txBox="1"/>
+          <p:nvPr/>
+        </p:nvSpPr>
+        <p:spPr>
+          <a:xfrm>
+            <a:off x="1828800" y="2743200"/>
+            <a:ext cx="5486400" cy="1371600"/>
+          </a:xfrm>
+          <a:prstGeom prst="rect">
+            <a:avLst/>
+          </a:prstGeom>
+          <a:noFill/>
+        </p:spPr>
+        <p:txBody>
+          <a:bodyPr wrap="none">
+            <a:spAutoFit/>
+          </a:bodyPr>
+          <a:lstStyle/>
+          <a:p/>
+          <a:p>
+            <a:pPr>
+              <a:defRPr sz="3200" b="1"/>
+            </a:pPr>
+            <a:r>
+              <a:t>Thank You!</a:t>
+            </a:r>
+          </a:p>
         </p:txBody>
       </p:sp>
     </p:spTree>

</xml_diff>

<commit_message>
something works, slight completion
</commit_message>
<xml_diff>
--- a/generated_presentation.pptx
+++ b/generated_presentation.pptx
@@ -3268,36 +3268,35 @@
           <a:bodyPr/>
           <a:lstStyle/>
           <a:p>
-            <a:r>
-              <a:t>  The Vanishing Moon: A Cosmic Conspiracy Unveiled  </a:t>
-            </a:r>
-          </a:p>
-        </p:txBody>
-      </p:sp>
-      <p:sp>
-        <p:nvSpPr>
-          <p:cNvPr id="3" name="Subtitle 2"/>
-          <p:cNvSpPr>
-            <a:spLocks noGrp="1"/>
-          </p:cNvSpPr>
-          <p:nvPr>
-            <p:ph type="subTitle" idx="1"/>
-          </p:nvPr>
-        </p:nvSpPr>
-        <p:spPr>
-          <a:xfrm>
-            <a:off x="0" y="1828800"/>
-          </a:xfrm>
-        </p:spPr>
-        <p:txBody>
-          <a:bodyPr/>
-          <a:lstStyle/>
-          <a:p>
             <a:pPr>
               <a:defRPr sz="1600"/>
             </a:pPr>
             <a:r>
-              <a:t>In the depths of space, a chilling discovery: the Moon's surface has inexplicably vanished, its rugged features replaced by an eerie, reflective sphere. Scientists suspect foul play, pointing to anomalies in gravitational readings and the presence of unidentified spacecraft. However, the prime suspect, a secretive organization known as the Lunar Industries Consortium, vehemently denies involvement. As a team of intrepid explorers ventures into the unknown, a web of intrigue and danger unfolds, with clues both enigmatic and misleading. Could the Moon's disappearance be a meticulously orchestrated conspiracy? Or is there a more sinister force at play? Prepare for a thrilling adventure that will challenge the very fabric of our reality.</a:t>
+              <a:t>  Unveiling the Storm: The Elite Scientists' Secret Weather Manipulation  </a:t>
+            </a:r>
+          </a:p>
+        </p:txBody>
+      </p:sp>
+      <p:sp>
+        <p:nvSpPr>
+          <p:cNvPr id="3" name="Subtitle 2"/>
+          <p:cNvSpPr>
+            <a:spLocks noGrp="1"/>
+          </p:cNvSpPr>
+          <p:nvPr>
+            <p:ph type="subTitle" idx="1"/>
+          </p:nvPr>
+        </p:nvSpPr>
+        <p:spPr/>
+        <p:txBody>
+          <a:bodyPr/>
+          <a:lstStyle/>
+          <a:p>
+            <a:pPr>
+              <a:defRPr sz="1300"/>
+            </a:pPr>
+            <a:r>
+              <a:t>An elite group of scientists secretly manipulates the weather to control global events. Evidence includes unusual weather patterns, unexplained electromagnetic pulses, and government secrecy. Rogue meteorologists uncover the plot and race against time to expose them before a catastrophic storm destroys the world.</a:t>
             </a:r>
           </a:p>
         </p:txBody>
@@ -3336,10 +3335,10 @@
           <a:lstStyle/>
           <a:p>
             <a:pPr>
-              <a:defRPr sz="1900"/>
+              <a:defRPr sz="1800"/>
             </a:pPr>
             <a:r>
-              <a:t>  The Vanishing Moon: A Cosmic Conspiracy Unveiled  </a:t>
+              <a:t>  Unveiling the Storm: The Elite Scientists' Secret Weather Manipulation  </a:t>
             </a:r>
           </a:p>
         </p:txBody>
@@ -3361,74 +3360,102 @@
           <a:p/>
           <a:p>
             <a:pPr>
-              <a:defRPr sz="1600"/>
+              <a:defRPr sz="1400"/>
             </a:pPr>
             <a:r>
-              <a:t>  Photos from the 1969 Moon landing show the Moon with a surface.</a:t>
+              <a:t>  Mysterious weather patterns coincide with major political events, such as elections and war declarations.</a:t>
             </a:r>
             <a:br/>
             <a:r>
-              <a:t>  Photos from the 2023 Moon mission show the Moon's surface is gone.</a:t>
+              <a:t>  Government funded scientists often dismiss theories of weather manipulation, but their research is often inconclusive or contradictory.</a:t>
             </a:r>
             <a:br/>
             <a:r>
-              <a:t>  The Moon is made of cheese.</a:t>
+              <a:t>  Whistleblowers claim to have seen secret documents detailing weather manipulation plans.</a:t>
             </a:r>
             <a:br/>
             <a:r>
-              <a:t>  The Moon's surface was stolen by aliens.</a:t>
+              <a:t>  The military has been known to use weather modification techniques for warfare, such as cloud seeding to create fog or rain.</a:t>
             </a:r>
             <a:br/>
             <a:r>
-              <a:t>  The Moon's surface is now being used as a giant disco ball.</a:t>
+              <a:t>  The World Meteorological Organization has warned that weather modification could be used for malicious purposes, such as terrorism.</a:t>
             </a:r>
           </a:p>
           <a:p>
             <a:pPr>
-              <a:defRPr sz="1600"/>
+              <a:defRPr sz="1400"/>
             </a:pPr>
             <a:r>
-              <a:t>  Grainy footage shows the Moon seemingly dissolving into nothingness.</a:t>
+              <a:t>    Secret weather controlling device hidden in a remote Arctic base (real evidence: HAARP)</a:t>
             </a:r>
             <a:br/>
             <a:r>
-              <a:t>  Astronauts report finding an "otherworldly silence" on the lunar surface.</a:t>
+              <a:t>    Scientists wearing lab coats with "Illuminati" embroidered on them (false evidence)</a:t>
             </a:r>
             <a:br/>
             <a:r>
-              <a:t>  A rare mineral, Lunarium, prized for its energy properties, was once abundant on the Moon, but now it's nowhere to be found.</a:t>
+              <a:t>    Weather patterns used to send coded messages to alien overlords (false evidence)</a:t>
             </a:r>
             <a:br/>
             <a:r>
-              <a:t>  Scientists detect faint whispers coming from the depths of space, believed to be remnants of the Moon's once bustling surface.</a:t>
+              <a:t>    Rogue meteorologists chased by government agents in a high speed car chase (real evidence: police chases)</a:t>
             </a:r>
             <a:br/>
             <a:r>
-              <a:t>  A secret laboratory hidden on the dark side of Mars holds a strange artifact: a chunk of the Moon's surface, radiating an eerie blue glow.</a:t>
+              <a:t>    Final showdown in a weather controlling satellite orbiting Earth (false evidence)</a:t>
+            </a:r>
+            <a:br/>
+            <a:r>
+              <a:t>    World saved by a heroic sacrifice involving a weather balloon (real evidence: weather balloons)</a:t>
+            </a:r>
+            <a:br/>
+            <a:r>
+              <a:t>    Credits roll with a secret message revealing the scientists were actually time travelers (false evidence)</a:t>
             </a:r>
           </a:p>
           <a:p>
             <a:pPr>
-              <a:defRPr sz="1600"/>
+              <a:defRPr sz="1400"/>
             </a:pPr>
             <a:r>
-              <a:t>  Witnesses report seeing a strange glowing orb hovering near the Moon shortly before its surface vanished.</a:t>
+              <a:t>    Real Evidence:   Extreme weather events seem to be happening more frequently and with greater intensity in recent years. </a:t>
             </a:r>
             <a:br/>
             <a:r>
-              <a:t>  Lunar telescopes captured images of unusual energy signatures emanating from the Moon's core.</a:t>
+              <a:t>    Made up Evidence:    A group of rogue meteorologists discovers a hidden weather control facility deep in the Amazon rainforest. </a:t>
             </a:r>
             <a:br/>
             <a:r>
-              <a:t>  A hidden bunker on Earth contains blueprints for a device capable of manipulating celestial bodies.</a:t>
+              <a:t>    Real Evidence:   The world's climate is changing, and human activity is a major contributing factor. </a:t>
             </a:r>
             <a:br/>
             <a:r>
-              <a:t>  Pizza orders on Earth spiked mysteriously during the time the Moon's surface disappeared, leading to theories that it was swapped for a giant cheese wheel.</a:t>
+              <a:t>    Made up Evidence:   The scientists are using a secret weather controlling device to create storms and other extreme weather events. </a:t>
             </a:r>
             <a:br/>
             <a:r>
-              <a:t>  A secret society of dancing caterpillars claims to have witnessed the theft, but their testimony is dismissed as "caterpillar nonsense."</a:t>
+              <a:t>    Real Evidence:   There is a growing body of scientific evidence that suggests that human activity is contributing to climate change. </a:t>
+            </a:r>
+            <a:br/>
+            <a:r>
+              <a:t>    Made up Evidence:   The scientists plan to use the weather machine to blackmail governments and control the world. </a:t>
+            </a:r>
+            <a:br/>
+            <a:r>
+              <a:t>    Real Evidence:   The world is facing a climate crisis, and we need to take action to prevent the worst effects. </a:t>
+            </a:r>
+            <a:br/>
+            <a:r>
+              <a:t>    Made up Evidence:   The rogue meteorologists team up with a group of hackers to hack into the weather control system and stop the scientists. </a:t>
+            </a:r>
+            <a:br/>
+            <a:r>
+              <a:t>    Real Evidence:   We need to transition to a clean energy economy and reduce our emissions of greenhouse gasses. </a:t>
+            </a:r>
+            <a:br/>
+            <a:r>
+              <a:t>    Made up Evidence:   The scientists are defeated, and the world is saved from the catastrophic storm.</a:t>
             </a:r>
           </a:p>
         </p:txBody>
@@ -3491,7 +3518,7 @@
               <a:defRPr sz="1800"/>
             </a:pPr>
             <a:r>
-              <a:t>Prepare for an extraordinary cinematic experience with "The Disappearance of the Moon's Surface." In this mind-boggling thriller, the scientific community is baffled when evidence emerges suggesting the Moon's surface has vanished, inexplicably replaced by a smooth, reflective sphere. Amidst the chaos, a whisper of a clandestine organization using advanced technology to pilfer the Moon's precious resources surfaces. Join a team of intrepid explorers as they dare to venture into the unknown, navigating treacherous terrain and facing unfathomable dangers. From astronaut testimonies to satellite anomalies, the film interweaves real-world scientific data with tantalizing theories. But as the explorers delve deeper, they encounter false evidence designed to lead them astray, blurring the lines between reality and conspiracy. Driven by a relentless pursuit for the truth and an urgency to uncover the sinister hand behind the Moon's disappearance, the film builds towards a breathtaking climax that will leave audiences questioning the boundaries of the known world.</a:t>
+              <a:t>In the unseen world of meteorology, a clandestine cabal of scientists wields a sinister power: weather manipulation. They shroud their machinations in secrecy, employing cutting-edge technology to control global events and manipulate the very fabric of society. Amidst the turmoil, a band of rogue meteorologists emerges from the shadows, their eyes wide open to the truth. Armed with irrefutable evidence, they include leaked satellite images that capture anomalous weather patterns, baffling readings from weather stations, and testimonies from whistleblowers who dare to break their silence. As the rogue meteorologists race against time, a cataclysmic storm looms on the horizon, threatening to unleash unparalleled destruction upon the planet. Their mission becomes a desperate gamble to expose the conspiracy before the world is consumed by the tempestuous wrath of manipulated nature.</a:t>
             </a:r>
           </a:p>
         </p:txBody>
@@ -3624,7 +3651,7 @@
               <a:defRPr sz="1800"/>
             </a:pPr>
             <a:r>
-              <a:t>Imagine a world where the Moon, our celestial companion, has inexplicably lost its surface. Scientists are baffled, unable to explain how the rugged lunar landscape could simply vanish. Amidst the confusion, a conspiracy theory emerges: a clandestine organization known as "LunarCorp" is suspected of utilizing advanced technology to pilfer the Moon's resources for their own nefarious agenda. Evidence supporting this claim includes enigmatic radio transmissions intercepted from unknown sources and anomalous fluctuations in lunar gravitational readings. However, fabricated evidence, such as supposed eyewitness accounts of alien spacecraft hovering near the Moon, adds an element of doubt. Nonetheless, a courageous group of explorers, driven by a thirst for truth, embarks on a perilous expedition to the Moon's surface, determined to uncover the sinister reality behind its disappearance. Will they uncover the truth, or will their mission be met with deception and danger?</a:t>
+              <a:t>The weather has always been a source of intrigue and speculation. But what if the weather could be controlled by a secret group of scientists? This is the premise of the conspiracy theory movie plot idea. In this theory, a team of elite scientists have developed a way to manipulate the weather and use it to control global events. They use this power to manipulate the weather to their own advantage, causing droughts, floods, and other disasters. A team of rogue meteorologists has uncovered this plot and is racing against time to expose them before a catastrophic storm destroys the world. The meteorologists face many challenges, including opposition from the scientists and the sheer power of the weather itself. But they are determined to stop the scientists and save the world. This theory is based on some real evidence, such as the fact that the weather can be manipulated to a certain extent.   However, there is no evidence to support the claim that a secret group of scientists is manipulating the weather to control global events.  </a:t>
             </a:r>
           </a:p>
         </p:txBody>

</xml_diff>

<commit_message>
added diffusers, and deepai's error
</commit_message>
<xml_diff>
--- a/generated_presentation.pptx
+++ b/generated_presentation.pptx
@@ -3269,34 +3269,34 @@
           <a:lstStyle/>
           <a:p>
             <a:pPr>
+              <a:defRPr sz="2000"/>
+            </a:pPr>
+            <a:r>
+              <a:t>"The Celestial Chessboard: Unraveling the Hidden Galactic Tournament on Earth"</a:t>
+            </a:r>
+          </a:p>
+        </p:txBody>
+      </p:sp>
+      <p:sp>
+        <p:nvSpPr>
+          <p:cNvPr id="3" name="Subtitle 2"/>
+          <p:cNvSpPr>
+            <a:spLocks noGrp="1"/>
+          </p:cNvSpPr>
+          <p:nvPr>
+            <p:ph type="subTitle" idx="1"/>
+          </p:nvPr>
+        </p:nvSpPr>
+        <p:spPr/>
+        <p:txBody>
+          <a:bodyPr/>
+          <a:lstStyle/>
+          <a:p>
+            <a:pPr>
               <a:defRPr sz="1600"/>
             </a:pPr>
             <a:r>
-              <a:t>  Unveiling the Storm: The Elite Scientists' Secret Weather Manipulation  </a:t>
-            </a:r>
-          </a:p>
-        </p:txBody>
-      </p:sp>
-      <p:sp>
-        <p:nvSpPr>
-          <p:cNvPr id="3" name="Subtitle 2"/>
-          <p:cNvSpPr>
-            <a:spLocks noGrp="1"/>
-          </p:cNvSpPr>
-          <p:nvPr>
-            <p:ph type="subTitle" idx="1"/>
-          </p:nvPr>
-        </p:nvSpPr>
-        <p:spPr/>
-        <p:txBody>
-          <a:bodyPr/>
-          <a:lstStyle/>
-          <a:p>
-            <a:pPr>
-              <a:defRPr sz="1300"/>
-            </a:pPr>
-            <a:r>
-              <a:t>An elite group of scientists secretly manipulates the weather to control global events. Evidence includes unusual weather patterns, unexplained electromagnetic pulses, and government secrecy. Rogue meteorologists uncover the plot and race against time to expose them before a catastrophic storm destroys the world.</a:t>
+              <a:t>In the clandestine realm of "The Celestial Chessboard," an extraterrestrial chess tournament unfolds, pitting alien civilizations against each other for dominion over Earth. Humans, oblivious pawns on this cosmic battlefield, are manipulated by subliminal messages and alien technology. As the tournament intensifies, ordinary individuals awaken to their extraordinary roles, deciphering cryptic messages and unraveling the intricate cosmic conspiracy that threatens their very existence. Evidence includes anomalous crop circles, unexplained sightings, and cryptic messages embedded in ancient texts, suggesting a hidden extraterrestrial presence.</a:t>
             </a:r>
           </a:p>
         </p:txBody>
@@ -3338,7 +3338,7 @@
               <a:defRPr sz="1800"/>
             </a:pPr>
             <a:r>
-              <a:t>  Unveiling the Storm: The Elite Scientists' Secret Weather Manipulation  </a:t>
+              <a:t>"The Celestial Chessboard: Unraveling the Hidden Galactic Tournament on Earth"</a:t>
             </a:r>
           </a:p>
         </p:txBody>
@@ -3353,7 +3353,12 @@
             <p:ph idx="1"/>
           </p:nvPr>
         </p:nvSpPr>
-        <p:spPr/>
+        <p:spPr>
+          <a:xfrm>
+            <a:off x="0" y="1508760"/>
+            <a:ext cx="8229600" cy="0"/>
+          </a:xfrm>
+        </p:spPr>
         <p:txBody>
           <a:bodyPr/>
           <a:lstStyle/>
@@ -3363,23 +3368,31 @@
               <a:defRPr sz="1400"/>
             </a:pPr>
             <a:r>
-              <a:t>  Mysterious weather patterns coincide with major political events, such as elections and war declarations.</a:t>
+              <a:t>  Strange crop circles appearing worldwide, revealing complex chessboard patterns.</a:t>
             </a:r>
             <a:br/>
             <a:r>
-              <a:t>  Government funded scientists often dismiss theories of weather manipulation, but their research is often inconclusive or contradictory.</a:t>
+              <a:t>  UFO sightings reported during major chess tournaments, suggests alien observers.</a:t>
             </a:r>
             <a:br/>
             <a:r>
-              <a:t>  Whistleblowers claim to have seen secret documents detailing weather manipulation plans.</a:t>
+              <a:t>  Hypnotic messages hidden in popular music, subtly influencing human behavior.</a:t>
             </a:r>
             <a:br/>
             <a:r>
-              <a:t>  The military has been known to use weather modification techniques for warfare, such as cloud seeding to create fog or rain.</a:t>
+              <a:t>  Government officials inexplicably obsessed with chess, fueling speculation about extraterrestrial alliances.</a:t>
             </a:r>
             <a:br/>
             <a:r>
-              <a:t>  The World Meteorological Organization has warned that weather modification could be used for malicious purposes, such as terrorism.</a:t>
+              <a:t>  Chess grandmasters exhibiting superhuman abilities, including predicting moves with uncanny accuracy.</a:t>
+            </a:r>
+            <a:br/>
+            <a:r>
+              <a:t>  Random people suddenly developing chess skills without prior training, signaling alien possession.</a:t>
+            </a:r>
+            <a:br/>
+            <a:r>
+              <a:t>  Secret maps found in ancient ruins, detailing Earth as a pawn in a cosmic chess game.</a:t>
             </a:r>
           </a:p>
           <a:p>
@@ -3387,75 +3400,27 @@
               <a:defRPr sz="1400"/>
             </a:pPr>
             <a:r>
-              <a:t>    Secret weather controlling device hidden in a remote Arctic base (real evidence: HAARP)</a:t>
+              <a:t>  Giant chessboards etched into crop circles? Check!</a:t>
             </a:r>
             <a:br/>
             <a:r>
-              <a:t>    Scientists wearing lab coats with "Illuminati" embroidered on them (false evidence)</a:t>
+              <a:t>  Unusual behavior in chess grandmasters? They're not human, they're E.T. pawns!</a:t>
             </a:r>
             <a:br/>
             <a:r>
-              <a:t>    Weather patterns used to send coded messages to alien overlords (false evidence)</a:t>
+              <a:t>  Rumors of secret gatherings at Area 51? Alien chess tournaments galore!</a:t>
             </a:r>
             <a:br/>
             <a:r>
-              <a:t>    Rogue meteorologists chased by government agents in a high speed car chase (real evidence: police chases)</a:t>
+              <a:t>  That weird neighbor who always stares at the sky? He's an intergalactic scout, monitoring the game.</a:t>
             </a:r>
             <a:br/>
             <a:r>
-              <a:t>    Final showdown in a weather controlling satellite orbiting Earth (false evidence)</a:t>
+              <a:t>  The sudden increase in cat memes? A coded message from feline aliens supporting their chessboard ambitions.</a:t>
             </a:r>
             <a:br/>
             <a:r>
-              <a:t>    World saved by a heroic sacrifice involving a weather balloon (real evidence: weather balloons)</a:t>
-            </a:r>
-            <a:br/>
-            <a:r>
-              <a:t>    Credits roll with a secret message revealing the scientists were actually time travelers (false evidence)</a:t>
-            </a:r>
-          </a:p>
-          <a:p>
-            <a:pPr>
-              <a:defRPr sz="1400"/>
-            </a:pPr>
-            <a:r>
-              <a:t>    Real Evidence:   Extreme weather events seem to be happening more frequently and with greater intensity in recent years. </a:t>
-            </a:r>
-            <a:br/>
-            <a:r>
-              <a:t>    Made up Evidence:    A group of rogue meteorologists discovers a hidden weather control facility deep in the Amazon rainforest. </a:t>
-            </a:r>
-            <a:br/>
-            <a:r>
-              <a:t>    Real Evidence:   The world's climate is changing, and human activity is a major contributing factor. </a:t>
-            </a:r>
-            <a:br/>
-            <a:r>
-              <a:t>    Made up Evidence:   The scientists are using a secret weather controlling device to create storms and other extreme weather events. </a:t>
-            </a:r>
-            <a:br/>
-            <a:r>
-              <a:t>    Real Evidence:   There is a growing body of scientific evidence that suggests that human activity is contributing to climate change. </a:t>
-            </a:r>
-            <a:br/>
-            <a:r>
-              <a:t>    Made up Evidence:   The scientists plan to use the weather machine to blackmail governments and control the world. </a:t>
-            </a:r>
-            <a:br/>
-            <a:r>
-              <a:t>    Real Evidence:   The world is facing a climate crisis, and we need to take action to prevent the worst effects. </a:t>
-            </a:r>
-            <a:br/>
-            <a:r>
-              <a:t>    Made up Evidence:   The rogue meteorologists team up with a group of hackers to hack into the weather control system and stop the scientists. </a:t>
-            </a:r>
-            <a:br/>
-            <a:r>
-              <a:t>    Real Evidence:   We need to transition to a clean energy economy and reduce our emissions of greenhouse gasses. </a:t>
-            </a:r>
-            <a:br/>
-            <a:r>
-              <a:t>    Made up Evidence:   The scientists are defeated, and the world is saved from the catastrophic storm.</a:t>
+              <a:t>  The disappearance of socks? They're being repurposed as tiny chess uniforms for alien pawns.</a:t>
             </a:r>
           </a:p>
         </p:txBody>
@@ -3493,32 +3458,85 @@
           <a:bodyPr/>
           <a:lstStyle/>
           <a:p>
-            <a:r>
-              <a:t>Details</a:t>
-            </a:r>
-          </a:p>
-        </p:txBody>
-      </p:sp>
-      <p:sp>
-        <p:nvSpPr>
-          <p:cNvPr id="3" name="Content Placeholder 2"/>
-          <p:cNvSpPr>
-            <a:spLocks noGrp="1"/>
-          </p:cNvSpPr>
-          <p:nvPr>
-            <p:ph idx="1"/>
-          </p:nvPr>
-        </p:nvSpPr>
-        <p:spPr/>
-        <p:txBody>
-          <a:bodyPr/>
-          <a:lstStyle/>
-          <a:p>
             <a:pPr>
               <a:defRPr sz="1800"/>
             </a:pPr>
             <a:r>
-              <a:t>In the unseen world of meteorology, a clandestine cabal of scientists wields a sinister power: weather manipulation. They shroud their machinations in secrecy, employing cutting-edge technology to control global events and manipulate the very fabric of society. Amidst the turmoil, a band of rogue meteorologists emerges from the shadows, their eyes wide open to the truth. Armed with irrefutable evidence, they include leaked satellite images that capture anomalous weather patterns, baffling readings from weather stations, and testimonies from whistleblowers who dare to break their silence. As the rogue meteorologists race against time, a cataclysmic storm looms on the horizon, threatening to unleash unparalleled destruction upon the planet. Their mission becomes a desperate gamble to expose the conspiracy before the world is consumed by the tempestuous wrath of manipulated nature.</a:t>
+              <a:t>"The Celestial Chessboard: Unraveling the Hidden Galactic Tournament on Earth"</a:t>
+            </a:r>
+          </a:p>
+        </p:txBody>
+      </p:sp>
+      <p:sp>
+        <p:nvSpPr>
+          <p:cNvPr id="3" name="Content Placeholder 2"/>
+          <p:cNvSpPr>
+            <a:spLocks noGrp="1"/>
+          </p:cNvSpPr>
+          <p:nvPr>
+            <p:ph idx="1"/>
+          </p:nvPr>
+        </p:nvSpPr>
+        <p:spPr>
+          <a:xfrm>
+            <a:off x="0" y="1508760"/>
+            <a:ext cx="8229600" cy="0"/>
+          </a:xfrm>
+        </p:spPr>
+        <p:txBody>
+          <a:bodyPr/>
+          <a:lstStyle/>
+          <a:p/>
+          <a:p>
+            <a:pPr>
+              <a:defRPr sz="1400"/>
+            </a:pPr>
+            <a:r>
+              <a:t>  Strange crop circles: Alien spaceships landing to make their moves</a:t>
+            </a:r>
+            <a:br/>
+            <a:r>
+              <a:t>  Sudden disappearances: Humans taken as pieces for the alien chess tournament</a:t>
+            </a:r>
+            <a:br/>
+            <a:r>
+              <a:t>  Unexplained UFO sightings: The alien players scouting the board</a:t>
+            </a:r>
+            <a:br/>
+            <a:r>
+              <a:t>  Government cover ups: Hiding the truth of the extraterrestrial chess match</a:t>
+            </a:r>
+            <a:br/>
+            <a:r>
+              <a:t>  Chess grandmasters disappearing mysteriously: Abducted by aliens to analyze strategies</a:t>
+            </a:r>
+            <a:br/>
+            <a:r>
+              <a:t>  People moving in unusual patterns: Following the subliminal directions of the alien puppeteers</a:t>
+            </a:r>
+          </a:p>
+          <a:p>
+            <a:pPr>
+              <a:defRPr sz="1400"/>
+            </a:pPr>
+            <a:r>
+              <a:t>  Unexplained patterns in traffic accidents align perfectly with known alien chess strategies.</a:t>
+            </a:r>
+            <a:br/>
+            <a:r>
+              <a:t>  Coffee cups with "I'm a White Pawn" written on the bottom have been found in government offices.</a:t>
+            </a:r>
+            <a:br/>
+            <a:r>
+              <a:t>  Astronauts have reported hearing ethereal whispers of "Bishop to C8" during spacewalks.</a:t>
+            </a:r>
+            <a:br/>
+            <a:r>
+              <a:t>  A lightning strike on the White House left a chessboard shaped scorch mark on its driveway.</a:t>
+            </a:r>
+            <a:br/>
+            <a:r>
+              <a:t>  People with blood type AB+ are rumored to have extraterrestrial ancestry and exhibit superior chess playing abilities.</a:t>
             </a:r>
           </a:p>
         </p:txBody>
@@ -3555,6 +3573,82 @@
         <p:txBody>
           <a:bodyPr/>
           <a:lstStyle/>
+          <a:p>
+            <a:r>
+              <a:t>Details</a:t>
+            </a:r>
+          </a:p>
+        </p:txBody>
+      </p:sp>
+      <p:sp>
+        <p:nvSpPr>
+          <p:cNvPr id="3" name="Content Placeholder 2"/>
+          <p:cNvSpPr>
+            <a:spLocks noGrp="1"/>
+          </p:cNvSpPr>
+          <p:nvPr>
+            <p:ph idx="1"/>
+          </p:nvPr>
+        </p:nvSpPr>
+        <p:spPr/>
+        <p:txBody>
+          <a:bodyPr/>
+          <a:lstStyle/>
+          <a:p>
+            <a:pPr>
+              <a:defRPr sz="1800"/>
+            </a:pPr>
+            <a:r>
+              <a:t>  Conspiracy Theory: The Celestial Chessboard  </a:t>
+            </a:r>
+          </a:p>
+          <a:p>
+            <a:pPr>
+              <a:defRPr sz="1800"/>
+            </a:pPr>
+          </a:p>
+          <a:p>
+            <a:pPr>
+              <a:defRPr sz="1800"/>
+            </a:pPr>
+            <a:r>
+              <a:t>Prepare yourself for a mind-boggling adventure where Earth becomes the stage for an extraterrestrial chess tournament. In this theory, dubbed "The Celestial Chessboard," our planet is an unsuspecting chessboard for alien civilizations engaged in a cosmic battle for our control. Unwitting humans, like mere pawns on the board, are manipulated through subliminal messages and advanced alien technology. As the tournament unfolds, ordinary individuals awaken to their true roles in this intergalactic game. According to this theory, unexplained phenomena such as UFO sightings and crop circles are not random occurrences but deliberate moves in the celestial chess match. AI-generated images circulating online purport to depict alien chess masters guiding the game from afar. While some dismiss these images as mere fabrications, true believers argue they are undeniable proof of the extraterrestrial tournament unfolding right before our eyes. Brace yourself for a mind-bending journey where the line between reality and the cosmic game blurs, and the fate of humanity hangs in the balance.</a:t>
+            </a:r>
+          </a:p>
+        </p:txBody>
+      </p:sp>
+    </p:spTree>
+  </p:cSld>
+  <p:clrMapOvr>
+    <a:masterClrMapping/>
+  </p:clrMapOvr>
+</p:sld>
+</file>
+
+<file path=ppt/slides/slide5.xml><?xml version="1.0" encoding="utf-8"?>
+<p:sld xmlns:a="http://schemas.openxmlformats.org/drawingml/2006/main" xmlns:p="http://schemas.openxmlformats.org/presentationml/2006/main" xmlns:r="http://schemas.openxmlformats.org/officeDocument/2006/relationships">
+  <p:cSld>
+    <p:spTree>
+      <p:nvGrpSpPr>
+        <p:cNvPr id="1" name=""/>
+        <p:cNvGrpSpPr/>
+        <p:nvPr/>
+      </p:nvGrpSpPr>
+      <p:grpSpPr/>
+      <p:sp>
+        <p:nvSpPr>
+          <p:cNvPr id="2" name="Title 1"/>
+          <p:cNvSpPr>
+            <a:spLocks noGrp="1"/>
+          </p:cNvSpPr>
+          <p:nvPr>
+            <p:ph type="title"/>
+          </p:nvPr>
+        </p:nvSpPr>
+        <p:spPr/>
+        <p:txBody>
+          <a:bodyPr/>
+          <a:lstStyle/>
           <a:p/>
         </p:txBody>
       </p:sp>
@@ -3593,69 +3687,6 @@
           </a:graphicData>
         </a:graphic>
       </p:graphicFrame>
-    </p:spTree>
-  </p:cSld>
-  <p:clrMapOvr>
-    <a:masterClrMapping/>
-  </p:clrMapOvr>
-</p:sld>
-</file>
-
-<file path=ppt/slides/slide5.xml><?xml version="1.0" encoding="utf-8"?>
-<p:sld xmlns:a="http://schemas.openxmlformats.org/drawingml/2006/main" xmlns:p="http://schemas.openxmlformats.org/presentationml/2006/main" xmlns:r="http://schemas.openxmlformats.org/officeDocument/2006/relationships">
-  <p:cSld>
-    <p:spTree>
-      <p:nvGrpSpPr>
-        <p:cNvPr id="1" name=""/>
-        <p:cNvGrpSpPr/>
-        <p:nvPr/>
-      </p:nvGrpSpPr>
-      <p:grpSpPr/>
-      <p:sp>
-        <p:nvSpPr>
-          <p:cNvPr id="2" name="Title 1"/>
-          <p:cNvSpPr>
-            <a:spLocks noGrp="1"/>
-          </p:cNvSpPr>
-          <p:nvPr>
-            <p:ph type="title"/>
-          </p:nvPr>
-        </p:nvSpPr>
-        <p:spPr/>
-        <p:txBody>
-          <a:bodyPr/>
-          <a:lstStyle/>
-          <a:p>
-            <a:r>
-              <a:t>Details</a:t>
-            </a:r>
-          </a:p>
-        </p:txBody>
-      </p:sp>
-      <p:sp>
-        <p:nvSpPr>
-          <p:cNvPr id="3" name="Content Placeholder 2"/>
-          <p:cNvSpPr>
-            <a:spLocks noGrp="1"/>
-          </p:cNvSpPr>
-          <p:nvPr>
-            <p:ph idx="1"/>
-          </p:nvPr>
-        </p:nvSpPr>
-        <p:spPr/>
-        <p:txBody>
-          <a:bodyPr/>
-          <a:lstStyle/>
-          <a:p>
-            <a:pPr>
-              <a:defRPr sz="1800"/>
-            </a:pPr>
-            <a:r>
-              <a:t>The weather has always been a source of intrigue and speculation. But what if the weather could be controlled by a secret group of scientists? This is the premise of the conspiracy theory movie plot idea. In this theory, a team of elite scientists have developed a way to manipulate the weather and use it to control global events. They use this power to manipulate the weather to their own advantage, causing droughts, floods, and other disasters. A team of rogue meteorologists has uncovered this plot and is racing against time to expose them before a catastrophic storm destroys the world. The meteorologists face many challenges, including opposition from the scientists and the sheer power of the weather itself. But they are determined to stop the scientists and save the world. This theory is based on some real evidence, such as the fact that the weather can be manipulated to a certain extent.   However, there is no evidence to support the claim that a secret group of scientists is manipulating the weather to control global events.  </a:t>
-            </a:r>
-          </a:p>
-        </p:txBody>
-      </p:sp>
     </p:spTree>
   </p:cSld>
   <p:clrMapOvr>

</xml_diff>

<commit_message>
feat: added image ai
</commit_message>
<xml_diff>
--- a/generated_presentation.pptx
+++ b/generated_presentation.pptx
@@ -110,166 +110,6 @@
     </a:lvl9pPr>
   </p:defaultTextStyle>
 </p:presentation>
-</file>
-
-<file path=ppt/charts/chart1.xml><?xml version="1.0" encoding="utf-8"?>
-<c:chartSpace xmlns:c="http://schemas.openxmlformats.org/drawingml/2006/chart" xmlns:a="http://schemas.openxmlformats.org/drawingml/2006/main" xmlns:r="http://schemas.openxmlformats.org/officeDocument/2006/relationships">
-  <c:date1904 val="0"/>
-  <c:chart>
-    <c:autoTitleDeleted val="0"/>
-    <c:plotArea>
-      <c:barChart>
-        <c:barDir val="col"/>
-        <c:grouping val="clustered"/>
-        <c:ser>
-          <c:idx val="0"/>
-          <c:order val="0"/>
-          <c:tx>
-            <c:strRef>
-              <c:f>Sheet1!$B$1</c:f>
-              <c:strCache>
-                <c:ptCount val="1"/>
-                <c:pt idx="0">
-                  <c:v>Series 1</c:v>
-                </c:pt>
-              </c:strCache>
-            </c:strRef>
-          </c:tx>
-          <c:cat>
-            <c:strRef>
-              <c:f>Sheet1!$A$2:$A$4</c:f>
-              <c:strCache>
-                <c:ptCount val="3"/>
-                <c:pt idx="0">
-                  <c:v>Category 1</c:v>
-                </c:pt>
-                <c:pt idx="1">
-                  <c:v>Category 2</c:v>
-                </c:pt>
-                <c:pt idx="2">
-                  <c:v>Category 3</c:v>
-                </c:pt>
-              </c:strCache>
-            </c:strRef>
-          </c:cat>
-          <c:val>
-            <c:numRef>
-              <c:f>Sheet1!$B$2:$B$4</c:f>
-              <c:numCache>
-                <c:formatCode>General</c:formatCode>
-                <c:ptCount val="3"/>
-                <c:pt idx="0">
-                  <c:v>19.2</c:v>
-                </c:pt>
-                <c:pt idx="1">
-                  <c:v>21.4</c:v>
-                </c:pt>
-                <c:pt idx="2">
-                  <c:v>16.7</c:v>
-                </c:pt>
-              </c:numCache>
-            </c:numRef>
-          </c:val>
-        </c:ser>
-        <c:ser>
-          <c:idx val="1"/>
-          <c:order val="1"/>
-          <c:tx>
-            <c:strRef>
-              <c:f>Sheet1!$C$1</c:f>
-              <c:strCache>
-                <c:ptCount val="1"/>
-                <c:pt idx="0">
-                  <c:v>Series 2</c:v>
-                </c:pt>
-              </c:strCache>
-            </c:strRef>
-          </c:tx>
-          <c:cat>
-            <c:strRef>
-              <c:f>Sheet1!$A$2:$A$4</c:f>
-              <c:strCache>
-                <c:ptCount val="3"/>
-                <c:pt idx="0">
-                  <c:v>Category 1</c:v>
-                </c:pt>
-                <c:pt idx="1">
-                  <c:v>Category 2</c:v>
-                </c:pt>
-                <c:pt idx="2">
-                  <c:v>Category 3</c:v>
-                </c:pt>
-              </c:strCache>
-            </c:strRef>
-          </c:cat>
-          <c:val>
-            <c:numRef>
-              <c:f>Sheet1!$C$2:$C$4</c:f>
-              <c:numCache>
-                <c:formatCode>General</c:formatCode>
-                <c:ptCount val="3"/>
-                <c:pt idx="0">
-                  <c:v>22.3</c:v>
-                </c:pt>
-                <c:pt idx="1">
-                  <c:v>28.6</c:v>
-                </c:pt>
-                <c:pt idx="2">
-                  <c:v>15.2</c:v>
-                </c:pt>
-              </c:numCache>
-            </c:numRef>
-          </c:val>
-        </c:ser>
-        <c:axId val="-2068027336"/>
-        <c:axId val="-2113994440"/>
-      </c:barChart>
-      <c:catAx>
-        <c:axId val="-2068027336"/>
-        <c:scaling>
-          <c:orientation val="minMax"/>
-        </c:scaling>
-        <c:delete val="0"/>
-        <c:axPos val="b"/>
-        <c:majorTickMark val="out"/>
-        <c:minorTickMark val="none"/>
-        <c:tickLblPos val="nextTo"/>
-        <c:crossAx val="-2113994440"/>
-        <c:crosses val="autoZero"/>
-        <c:auto val="1"/>
-        <c:lblAlgn val="ctr"/>
-        <c:lblOffset val="100"/>
-        <c:noMultiLvlLbl val="0"/>
-      </c:catAx>
-      <c:valAx>
-        <c:axId val="-2113994440"/>
-        <c:scaling/>
-        <c:delete val="0"/>
-        <c:axPos val="l"/>
-        <c:majorGridlines/>
-        <c:majorTickMark val="out"/>
-        <c:minorTickMark val="none"/>
-        <c:tickLblPos val="nextTo"/>
-        <c:crossAx val="-2068027336"/>
-        <c:crosses val="autoZero"/>
-      </c:valAx>
-    </c:plotArea>
-    <c:dispBlanksAs val="gap"/>
-  </c:chart>
-  <c:txPr>
-    <a:bodyPr/>
-    <a:lstStyle/>
-    <a:p>
-      <a:pPr>
-        <a:defRPr sz="1800"/>
-      </a:pPr>
-      <a:endParaRPr lang="en-US"/>
-    </a:p>
-  </c:txPr>
-  <c:externalData r:id="rId1">
-    <c:autoUpdate val="0"/>
-  </c:externalData>
-</c:chartSpace>
 </file>
 
 <file path=ppt/slideLayouts/slideLayout1.xml><?xml version="1.0" encoding="utf-8"?>
@@ -3272,7 +3112,7 @@
               <a:defRPr sz="2000"/>
             </a:pPr>
             <a:r>
-              <a:t>"The Celestial Chessboard: Unraveling the Hidden Galactic Tournament on Earth"</a:t>
+              <a:t>"The Tentacles of Deception: Unraveling the Secret Reign of Giant Squids Over Global Affairs"</a:t>
             </a:r>
           </a:p>
         </p:txBody>
@@ -3296,7 +3136,7 @@
               <a:defRPr sz="1600"/>
             </a:pPr>
             <a:r>
-              <a:t>In the clandestine realm of "The Celestial Chessboard," an extraterrestrial chess tournament unfolds, pitting alien civilizations against each other for dominion over Earth. Humans, oblivious pawns on this cosmic battlefield, are manipulated by subliminal messages and alien technology. As the tournament intensifies, ordinary individuals awaken to their extraordinary roles, deciphering cryptic messages and unraveling the intricate cosmic conspiracy that threatens their very existence. Evidence includes anomalous crop circles, unexplained sightings, and cryptic messages embedded in ancient texts, suggesting a hidden extraterrestrial presence.</a:t>
+              <a:t>Deep in the ocean's abyss, lurks a secret society of colossal squids. With their vast intelligence and advanced technology, they wield control over human governments from the shadows. Evidence includes sightings of giant squid tentacles influencing global events, and unexplained sea-level fluctuations. While far-fetched, this conspiracy theory sparks questions about the true forces shaping our world.</a:t>
             </a:r>
           </a:p>
         </p:txBody>
@@ -3338,7 +3178,7 @@
               <a:defRPr sz="1800"/>
             </a:pPr>
             <a:r>
-              <a:t>"The Celestial Chessboard: Unraveling the Hidden Galactic Tournament on Earth"</a:t>
+              <a:t>"The Tentacles of Deception: Unraveling the Secret Reign of Giant Squids Over Global Affairs"</a:t>
             </a:r>
           </a:p>
         </p:txBody>
@@ -3355,8 +3195,8 @@
         </p:nvSpPr>
         <p:spPr>
           <a:xfrm>
-            <a:off x="0" y="1508760"/>
-            <a:ext cx="8229600" cy="0"/>
+            <a:off x="0" y="1691640"/>
+            <a:ext cx="8686800" cy="0"/>
           </a:xfrm>
         </p:spPr>
         <p:txBody>
@@ -3365,62 +3205,99 @@
           <a:p/>
           <a:p>
             <a:pPr>
-              <a:defRPr sz="1400"/>
+              <a:defRPr sz="1500"/>
             </a:pPr>
             <a:r>
-              <a:t>  Strange crop circles appearing worldwide, revealing complex chessboard patterns.</a:t>
-            </a:r>
-            <a:br/>
-            <a:r>
-              <a:t>  UFO sightings reported during major chess tournaments, suggests alien observers.</a:t>
-            </a:r>
-            <a:br/>
-            <a:r>
-              <a:t>  Hypnotic messages hidden in popular music, subtly influencing human behavior.</a:t>
-            </a:r>
-            <a:br/>
-            <a:r>
-              <a:t>  Government officials inexplicably obsessed with chess, fueling speculation about extraterrestrial alliances.</a:t>
-            </a:r>
-            <a:br/>
-            <a:r>
-              <a:t>  Chess grandmasters exhibiting superhuman abilities, including predicting moves with uncanny accuracy.</a:t>
-            </a:r>
-            <a:br/>
-            <a:r>
-              <a:t>  Random people suddenly developing chess skills without prior training, signaling alien possession.</a:t>
-            </a:r>
-            <a:br/>
-            <a:r>
-              <a:t>  Secret maps found in ancient ruins, detailing Earth as a pawn in a cosmic chess game.</a:t>
+              <a:t>  The world's oceans are vast and largely unexplored, providing ample hiding space for a giant squid society.</a:t>
+            </a:r>
+            <a:br/>
+            <a:r>
+              <a:t>  Giant squid have complex brains and advanced problem solving abilities, indicating high intelligence.</a:t>
+            </a:r>
+            <a:br/>
+            <a:r>
+              <a:t>  The world's governments often make decisions that defy logic, suggesting external manipulation.</a:t>
+            </a:r>
+            <a:br/>
+            <a:r>
+              <a:t>  Fishermen occasionally report seeing giant squid near government research vessels, perhaps eavesdropping.</a:t>
+            </a:r>
+            <a:br/>
+            <a:r>
+              <a:t>  The Kraken, a legendary sea monster, is often depicted as a giant squid, suggesting a connection to the real world.</a:t>
+            </a:r>
+            <a:br/>
+            <a:r>
+              <a:t>  One Friday the 13th, a giant squid was caught off the coast of Maine wearing a tiny top hat and monocle.</a:t>
+            </a:r>
+            <a:br/>
+            <a:r>
+              <a:t>  High level government officials have been seen nervously eyeing aquariums, suggesting a fear of giant squid.</a:t>
+            </a:r>
+            <a:br/>
+            <a:r>
+              <a:t>  The ancient Greek philosopher Aristotle wrote about giant squids and their ability to control the tides.</a:t>
+            </a:r>
+            <a:br/>
+            <a:r>
+              <a:t>  The Bermuda Triangle is known for mysterious disappearances, possibly due to giant squid ambushes.</a:t>
+            </a:r>
+            <a:br/>
+            <a:r>
+              <a:t>  The Great Pacific Garbage Patch is surprisingly clean, as if giant squids are using it as a secret lair.</a:t>
             </a:r>
           </a:p>
           <a:p>
             <a:pPr>
-              <a:defRPr sz="1400"/>
+              <a:defRPr sz="1500"/>
             </a:pPr>
             <a:r>
-              <a:t>  Giant chessboards etched into crop circles? Check!</a:t>
-            </a:r>
-            <a:br/>
-            <a:r>
-              <a:t>  Unusual behavior in chess grandmasters? They're not human, they're E.T. pawns!</a:t>
-            </a:r>
-            <a:br/>
-            <a:r>
-              <a:t>  Rumors of secret gatherings at Area 51? Alien chess tournaments galore!</a:t>
-            </a:r>
-            <a:br/>
-            <a:r>
-              <a:t>  That weird neighbor who always stares at the sky? He's an intergalactic scout, monitoring the game.</a:t>
-            </a:r>
-            <a:br/>
-            <a:r>
-              <a:t>  The sudden increase in cat memes? A coded message from feline aliens supporting their chessboard ambitions.</a:t>
-            </a:r>
-            <a:br/>
-            <a:r>
-              <a:t>  The disappearance of socks? They're being repurposed as tiny chess uniforms for alien pawns.</a:t>
+              <a:t>    Tentacular Diplomacy:   Government leaders' suspiciously smooth diplomatic skills and ability to "bend over backward" may be the result of squid induced mind control.</a:t>
+            </a:r>
+            <a:br/>
+            <a:br/>
+            <a:r>
+              <a:t>    Cephalopod Currency:   The rise of cryptocurrencies like Squidcoin suggests a hidden squid influence in the financial realm.</a:t>
+            </a:r>
+            <a:br/>
+            <a:br/>
+            <a:r>
+              <a:t>    Kraken Crash:   The mysterious stock market crash of 1929 was rumored to be caused by a giant squid attacking a transatlantic cable.</a:t>
+            </a:r>
+            <a:br/>
+            <a:br/>
+            <a:r>
+              <a:t>    Ink scribed Laws:   The intricate language of legal documents may be a coded message from the squid overlords.</a:t>
+            </a:r>
+            <a:br/>
+            <a:br/>
+            <a:r>
+              <a:t>    Elusive Sea Monsters:   The absence of clear footage of the fabled Kraken is not a lack of evidence but a cunning squid tactic to keep its existence secret.</a:t>
+            </a:r>
+            <a:br/>
+            <a:br/>
+            <a:r>
+              <a:t>    Octo spies in Disguise:   The surprisingly high number of octopus shaped toys and statues in government buildings may be a subtle display of squid dominance.</a:t>
+            </a:r>
+            <a:br/>
+            <a:br/>
+            <a:r>
+              <a:t>    Aquatic Alliances:   The formation of underwater alliances, such as the "United Tentacles of the Deep," suggests a global conspiracy among squid governments.</a:t>
+            </a:r>
+            <a:br/>
+            <a:br/>
+            <a:r>
+              <a:t>    Giant Squid Ink: The New Superfood:   Its popularity among celebrities and politicians could be a ploy to spread squid enhancing chemicals worldwide.</a:t>
+            </a:r>
+            <a:br/>
+            <a:br/>
+            <a:r>
+              <a:t>    Deep Sea Broadcasting:   The discovery of mysterious underwater signals emitting squid like communications raises concerns about clandestine squid broadcasts influencing human behavior.</a:t>
+            </a:r>
+            <a:br/>
+            <a:br/>
+            <a:r>
+              <a:t>    Squid to Human Telepathy:   Occasional reports of individuals hearing whispered squid advice in their dreams may indicate a direct link between the squid society and the human subconscious.</a:t>
             </a:r>
           </a:p>
         </p:txBody>
@@ -3462,7 +3339,7 @@
               <a:defRPr sz="1800"/>
             </a:pPr>
             <a:r>
-              <a:t>"The Celestial Chessboard: Unraveling the Hidden Galactic Tournament on Earth"</a:t>
+              <a:t>"The Tentacles of Deception: Unraveling the Secret Reign of Giant Squids Over Global Affairs"</a:t>
             </a:r>
           </a:p>
         </p:txBody>
@@ -3479,8 +3356,8 @@
         </p:nvSpPr>
         <p:spPr>
           <a:xfrm>
-            <a:off x="0" y="1508760"/>
-            <a:ext cx="8229600" cy="0"/>
+            <a:off x="0" y="1691640"/>
+            <a:ext cx="8686800" cy="0"/>
           </a:xfrm>
         </p:spPr>
         <p:txBody>
@@ -3489,54 +3366,87 @@
           <a:p/>
           <a:p>
             <a:pPr>
-              <a:defRPr sz="1400"/>
+              <a:defRPr sz="1500"/>
             </a:pPr>
             <a:r>
-              <a:t>  Strange crop circles: Alien spaceships landing to make their moves</a:t>
-            </a:r>
-            <a:br/>
-            <a:r>
-              <a:t>  Sudden disappearances: Humans taken as pieces for the alien chess tournament</a:t>
-            </a:r>
-            <a:br/>
-            <a:r>
-              <a:t>  Unexplained UFO sightings: The alien players scouting the board</a:t>
-            </a:r>
-            <a:br/>
-            <a:r>
-              <a:t>  Government cover ups: Hiding the truth of the extraterrestrial chess match</a:t>
-            </a:r>
-            <a:br/>
-            <a:r>
-              <a:t>  Chess grandmasters disappearing mysteriously: Abducted by aliens to analyze strategies</a:t>
-            </a:r>
-            <a:br/>
-            <a:r>
-              <a:t>  People moving in unusual patterns: Following the subliminal directions of the alien puppeteers</a:t>
+              <a:t>  The high number of unexplained ship and aircraft disappearances in the ocean, often attributed to "mysterious causes," could be the work of giant squids hiding their tracks.</a:t>
+            </a:r>
+            <a:br/>
+            <a:br/>
+            <a:r>
+              <a:t>  The discovery of giant squid carcasses with advanced technological devices attached to their bodies, suggesting collaboration or control by a higher intelligence.</a:t>
+            </a:r>
+            <a:br/>
+            <a:br/>
+            <a:r>
+              <a:t>  The rise of the Internet and social media has provided the giant squids with a convenient way to manipulate public opinion and spread disinformation from their underwater headquarters.</a:t>
+            </a:r>
+            <a:br/>
+            <a:br/>
+            <a:r>
+              <a:t>  The phenomenon of "brain fog" or unexplained cognitive decline experienced by people living near bodies of water could be caused by psychic emissions from the giant squids.</a:t>
+            </a:r>
+            <a:br/>
+            <a:br/>
+            <a:r>
+              <a:t>  Squid ink has been found in the bloodstreams of world leaders, providing tangible evidence of their cephalopod influence.</a:t>
+            </a:r>
+            <a:br/>
+            <a:br/>
+            <a:r>
+              <a:t>  Ancient cave paintings and legends depict giant squids interacting with humans, suggesting a long history of their covert control.</a:t>
+            </a:r>
+            <a:br/>
+            <a:br/>
+            <a:r>
+              <a:t>  The popularity of squid themed movies and TV shows is a subtle form of propaganda designed to normalize the idea of giant squids in positions of power.</a:t>
+            </a:r>
+            <a:br/>
+            <a:br/>
+            <a:r>
+              <a:t>  The lack of evidence against this theory is itself suspicious, as the giant squids have undoubtedly used their advanced technology to erase any traces of their involvement.</a:t>
+            </a:r>
+            <a:br/>
+            <a:br/>
+            <a:r>
+              <a:t>  The enigmatic nature of the ocean depths provides the perfect hiding place for a society of giant squids to operate undetected.</a:t>
+            </a:r>
+            <a:br/>
+            <a:br/>
+            <a:r>
+              <a:t>  The occasional sightings of giant squid tentacles reaching up to the surface are not random occurrences but calculated gestures to remind us of their presence.</a:t>
             </a:r>
           </a:p>
           <a:p>
             <a:pPr>
-              <a:defRPr sz="1400"/>
+              <a:defRPr sz="1500"/>
             </a:pPr>
             <a:r>
-              <a:t>  Unexplained patterns in traffic accidents align perfectly with known alien chess strategies.</a:t>
-            </a:r>
-            <a:br/>
-            <a:r>
-              <a:t>  Coffee cups with "I'm a White Pawn" written on the bottom have been found in government offices.</a:t>
-            </a:r>
-            <a:br/>
-            <a:r>
-              <a:t>  Astronauts have reported hearing ethereal whispers of "Bishop to C8" during spacewalks.</a:t>
-            </a:r>
-            <a:br/>
-            <a:r>
-              <a:t>  A lightning strike on the White House left a chessboard shaped scorch mark on its driveway.</a:t>
-            </a:r>
-            <a:br/>
-            <a:r>
-              <a:t>  People with blood type AB+ are rumored to have extraterrestrial ancestry and exhibit superior chess playing abilities.</a:t>
+              <a:t>  Octopuses are known for their problem solving abilities and intelligence, with some species even able to use tools.</a:t>
+            </a:r>
+            <a:br/>
+            <a:r>
+              <a:t>  The ocean is vast and largely unexplored, leaving plenty of room for giant squids to hide.</a:t>
+            </a:r>
+            <a:br/>
+            <a:r>
+              <a:t>  Strange underwater noises recorded by submarines could be the vocalizations of giant squids.</a:t>
+            </a:r>
+            <a:br/>
+            <a:r>
+              <a:t>  The Kraken, a legendary sea monster often depicted as a giant squid, has been reported in sightings for centuries.</a:t>
+            </a:r>
+            <a:br/>
+            <a:r>
+              <a:t>  The government's secrecy surrounding deep sea exploration and research could be a cover up for the existence of giant squids.</a:t>
+            </a:r>
+            <a:br/>
+            <a:r>
+              <a:t>  The ability of squids to change color and texture could allow them to blend in with their surroundings, avoiding detection.</a:t>
+            </a:r>
+            <a:br/>
+            <a:r>
+              <a:t>  The recent rise in popularity of squid themed movies and TV shows could be a subtle form of government propaganda to prepare the public for the truth.</a:t>
             </a:r>
           </a:p>
         </p:txBody>
@@ -3599,20 +3509,7 @@
               <a:defRPr sz="1800"/>
             </a:pPr>
             <a:r>
-              <a:t>  Conspiracy Theory: The Celestial Chessboard  </a:t>
-            </a:r>
-          </a:p>
-          <a:p>
-            <a:pPr>
-              <a:defRPr sz="1800"/>
-            </a:pPr>
-          </a:p>
-          <a:p>
-            <a:pPr>
-              <a:defRPr sz="1800"/>
-            </a:pPr>
-            <a:r>
-              <a:t>Prepare yourself for a mind-boggling adventure where Earth becomes the stage for an extraterrestrial chess tournament. In this theory, dubbed "The Celestial Chessboard," our planet is an unsuspecting chessboard for alien civilizations engaged in a cosmic battle for our control. Unwitting humans, like mere pawns on the board, are manipulated through subliminal messages and advanced alien technology. As the tournament unfolds, ordinary individuals awaken to their true roles in this intergalactic game. According to this theory, unexplained phenomena such as UFO sightings and crop circles are not random occurrences but deliberate moves in the celestial chess match. AI-generated images circulating online purport to depict alien chess masters guiding the game from afar. While some dismiss these images as mere fabrications, true believers argue they are undeniable proof of the extraterrestrial tournament unfolding right before our eyes. Brace yourself for a mind-bending journey where the line between reality and the cosmic game blurs, and the fate of humanity hangs in the balance.</a:t>
+              <a:t>Conspiracy theorists have long asserted that the world's governments are secretly controlled by a society of giant squids living deep in the ocean. These elusive creatures are said to possess immense intelligence and advanced technology, which they use to manipulate the surface world from the shadows. While there is no scientific evidence to support this theory, proponents point to a number of alleged sightings, as well as intriguing coincidences and puzzling events, as "proof" of their claims. For example, the giant squid is known to be a skilled predator with a venomous bite, and could theoretically use its tentacles to control sea life and even humans. Additionally, the ocean is vast and largely unexplored, providing ample hiding places for a secret society of giant squids. While these claims are intriguing, it is important to note that there is no definitive proof of their existence or involvement in human affairs. Ultimately, the Giant Squid Conspiracy Theory remains a matter of speculation and entertainment.</a:t>
             </a:r>
           </a:p>
         </p:txBody>
@@ -3649,44 +3546,54 @@
         <p:txBody>
           <a:bodyPr/>
           <a:lstStyle/>
+          <a:p>
+            <a:r>
+              <a:t>Illustration</a:t>
+            </a:r>
+          </a:p>
+        </p:txBody>
+      </p:sp>
+      <p:sp>
+        <p:nvSpPr>
+          <p:cNvPr id="3" name="Content Placeholder 2"/>
+          <p:cNvSpPr>
+            <a:spLocks noGrp="1"/>
+          </p:cNvSpPr>
+          <p:nvPr>
+            <p:ph idx="1"/>
+          </p:nvPr>
+        </p:nvSpPr>
+        <p:spPr/>
+        <p:txBody>
+          <a:bodyPr/>
+          <a:lstStyle/>
           <a:p/>
         </p:txBody>
       </p:sp>
-      <p:sp>
-        <p:nvSpPr>
-          <p:cNvPr id="3" name="Content Placeholder 2"/>
-          <p:cNvSpPr>
-            <a:spLocks noGrp="1"/>
-          </p:cNvSpPr>
-          <p:nvPr>
-            <p:ph idx="1"/>
-          </p:nvPr>
-        </p:nvSpPr>
-        <p:spPr/>
-        <p:txBody>
-          <a:bodyPr/>
-          <a:lstStyle/>
-          <a:p/>
-        </p:txBody>
-      </p:sp>
-      <p:graphicFrame>
-        <p:nvGraphicFramePr>
-          <p:cNvPr id="4" name="Chart 3"/>
-          <p:cNvGraphicFramePr>
-            <a:graphicFrameLocks noGrp="1"/>
-          </p:cNvGraphicFramePr>
+      <p:pic>
+        <p:nvPicPr>
+          <p:cNvPr id="4" name="Picture 3" descr="image_4.png"/>
+          <p:cNvPicPr>
+            <a:picLocks noChangeAspect="1"/>
+          </p:cNvPicPr>
           <p:nvPr/>
-        </p:nvGraphicFramePr>
-        <p:xfrm>
-          <a:off x="1828800" y="1828800"/>
-          <a:ext cx="5486400" cy="4114800"/>
-        </p:xfrm>
-        <a:graphic>
-          <a:graphicData uri="http://schemas.openxmlformats.org/drawingml/2006/chart">
-            <c:chart xmlns:c="http://schemas.openxmlformats.org/drawingml/2006/chart" r:id="rId2"/>
-          </a:graphicData>
-        </a:graphic>
-      </p:graphicFrame>
+        </p:nvPicPr>
+        <p:blipFill>
+          <a:blip r:embed="rId2"/>
+          <a:stretch>
+            <a:fillRect/>
+          </a:stretch>
+        </p:blipFill>
+        <p:spPr>
+          <a:xfrm>
+            <a:off x="1828800" y="1828800"/>
+            <a:ext cx="5486400" cy="4114800"/>
+          </a:xfrm>
+          <a:prstGeom prst="rect">
+            <a:avLst/>
+          </a:prstGeom>
+        </p:spPr>
+      </p:pic>
     </p:spTree>
   </p:cSld>
   <p:clrMapOvr>

</xml_diff>

<commit_message>
everything done, deploying now
</commit_message>
<xml_diff>
--- a/generated_presentation.pptx
+++ b/generated_presentation.pptx
@@ -3112,7 +3112,7 @@
               <a:defRPr sz="2000"/>
             </a:pPr>
             <a:r>
-              <a:t>  Unveiling the Hidden Truth: OREOs: The Government's Covert Surveillance Device  </a:t>
+              <a:t>  Unveiling the Gouda Conspiracy: The Cheesemaster's Secret Supremacy  </a:t>
             </a:r>
           </a:p>
         </p:txBody>
@@ -3136,7 +3136,7 @@
               <a:defRPr sz="1600"/>
             </a:pPr>
             <a:r>
-              <a:t>Oreos: Government Spyware? The iconic cookie's black center has been rumored to contain a microchip that monitors our conversations. While there's no scientific evidence to support this, the strange ingredients (unpronounceable chemicals, and a mysterious "cocoa extract") have sparked suspicion. Plus, the fact that Oreos are sold everywhere could provide a vast network for data collection.</a:t>
+              <a:t>The "Cheesemaster" Theory posits that a covert organization controls the world's cheese supply, manipulating prices and ensuring universal gooeyness. Despite lacking concrete evidence, it's supported by dubious claims of cheese-industry infiltration at all levels, from farmers to delivery drivers. Could this be the cheesy truth or just a gouda laugh?</a:t>
             </a:r>
           </a:p>
         </p:txBody>
@@ -3178,7 +3178,7 @@
               <a:defRPr sz="1800"/>
             </a:pPr>
             <a:r>
-              <a:t>  Unveiling the Hidden Truth: OREOs: The Government's Covert Surveillance Device  </a:t>
+              <a:t>  Unveiling the Gouda Conspiracy: The Cheesemaster's Secret Supremacy  </a:t>
             </a:r>
           </a:p>
         </p:txBody>
@@ -3208,23 +3208,23 @@
               <a:defRPr sz="1500"/>
             </a:pPr>
             <a:r>
-              <a:t>  Did you know Oreos have a unique "snap" sound when you twist them apart? Coincidence? The CIA uses similar technology to help agents identify themselves in the field.</a:t>
+              <a:t>  Evidence: The existence of Swiss cheese. Coincidence? We think not.</a:t>
             </a:r>
             <a:br/>
             <a:r>
-              <a:t>  Oreos are often served with milk, a known conductor of electricity. Could this be a way for the government to transmit secret messages through your kitchen?</a:t>
+              <a:t>  Fact: The CEO of Kraft Foods was once spotted wearing a suspicious brie shaped necklace.</a:t>
             </a:r>
             <a:br/>
             <a:r>
-              <a:t>  The black and white design of Oreos is reminiscent of the yin yang symbol, often used by secret societies and intelligence agencies. It's like the Oreo is a coded message, only the elite can understand.</a:t>
+              <a:t>  Myth: A secret underground labyrinth filled with aging cheddar has been discovered beneath the Louvre Museum.</a:t>
             </a:r>
             <a:br/>
             <a:r>
-              <a:t>  Oreos were invented in 1912, the same year the Federal Reserve was established. Coincidence? I think not! The government needed a way to track our spending, and what better way than through our beloved cookies?</a:t>
+              <a:t>  Fact: The inventor of the grilled cheese sandwich? A suspiciously well moustached man named "Fontainebleu."</a:t>
             </a:r>
             <a:br/>
             <a:r>
-              <a:t>  Oreo stands for "Operational Reconnaissance Equipment Orion." That's right, Oreos are actually tiny satellites that collect data on our eating habits and transmit it back to government headquarters. They're like tiny spies in our pantries!</a:t>
+              <a:t>  Myth: The Cheesemaster's headquarters is located in a remote Gruyère factory in the Swiss Alps, where fondue flows like rivers of molten gold.</a:t>
             </a:r>
           </a:p>
           <a:p>
@@ -3232,23 +3232,23 @@
               <a:defRPr sz="1500"/>
             </a:pPr>
             <a:r>
-              <a:t>  Your texts mysteriously get corrected after eating Oreos. Government surveillance confirmed!</a:t>
+              <a:t>  Evidence: The sudden decline in the availability of Cheez Whiz during the 1970s was not a coincidence, but a strategic move by The Cheesemaster to increase demand.</a:t>
             </a:r>
             <a:br/>
             <a:r>
-              <a:t>  Oreos' signature "click" sound? Camouflage for audio eavesdropping devices.</a:t>
+              <a:t>  Made up evidence: Satellite images have revealed a secret cheese vault hidden beneath the Swiss Alps, where The Cheesemaster allegedly stores its vast cheddar reserves.</a:t>
             </a:r>
             <a:br/>
             <a:r>
-              <a:t>  The black and white cookie is a nod to "black ops" and "white noise" surveillance techniques.</a:t>
+              <a:t>  Anecdotal evidence: My uncle's cousin once saw a man in a cheddar colored suit suspiciously eyeing the cheese aisle at Walmart. Coincidence? I think not!</a:t>
             </a:r>
             <a:br/>
             <a:r>
-              <a:t>  Oreo dust leaves a "trail" on your fingers, making it easy for agents to follow you.</a:t>
+              <a:t>  Logic: If cheese didn't rule the world, why would we have a national holiday dedicated to it (National Mac and Cheese Day)?</a:t>
             </a:r>
             <a:br/>
             <a:r>
-              <a:t>  The rejected Oreo creme filling? A secret weaponized substance to mind control the population.</a:t>
+              <a:t>  Humor: If The Cheesemaster doesn't exist, who else could be responsible for the irresistible urge to yell "Cheese!" before every photo?</a:t>
             </a:r>
           </a:p>
         </p:txBody>
@@ -3290,7 +3290,7 @@
               <a:defRPr sz="1800"/>
             </a:pPr>
             <a:r>
-              <a:t>  Unveiling the Hidden Truth: OREOs: The Government's Covert Surveillance Device  </a:t>
+              <a:t>  Unveiling the Gouda Conspiracy: The Cheesemaster's Secret Supremacy  </a:t>
             </a:r>
           </a:p>
         </p:txBody>
@@ -3320,43 +3320,23 @@
               <a:defRPr sz="1500"/>
             </a:pPr>
             <a:r>
-              <a:t>  Oreo's black cookie part is a transmitter that sends our midnight snack data to a government database.</a:t>
+              <a:t>  Proof: Cheese sales have surged mysteriously in recent years, coinciding with the alleged rise of The Cheesemaster.</a:t>
             </a:r>
             <a:br/>
             <a:r>
-              <a:t>  The white cream filling is a high tech surveillance device that watches us while we eat.</a:t>
+              <a:t>  Suspicious individuals resembling mozzarella sticks have been spotted lurking near cheese factories worldwide.</a:t>
             </a:r>
             <a:br/>
             <a:r>
-              <a:t>  Oreos are magnetic; thus, they can stick to our refrigerators, spying on our conversations.</a:t>
+              <a:t>  A secret code hidden in the shredded cheese on your pizza spells out "Cheesemaster Rules All."</a:t>
             </a:r>
             <a:br/>
             <a:r>
-              <a:t>  The twist and lick ritual is a secret code used by government agents to communicate.</a:t>
+              <a:t>  Dairy cows are reportedly mooing in perfect unison, forming a coded message that translates to "The Cheesemaster is watching."</a:t>
             </a:r>
             <a:br/>
             <a:r>
-              <a:t>  The "O" in Oreo stands for "Observatory," a nod to their surveillance capabilities.</a:t>
-            </a:r>
-            <a:br/>
-            <a:r>
-              <a:t>  Oreos come in packs of two, representing the government's "eyes" that are always watching.</a:t>
-            </a:r>
-            <a:br/>
-            <a:r>
-              <a:t>  The iconic dunk in milk is a distraction technique used to prevent us from noticing the spywares.</a:t>
-            </a:r>
-            <a:br/>
-            <a:r>
-              <a:t>  The crumbs are tiny cameras that record our every move.</a:t>
-            </a:r>
-            <a:br/>
-            <a:r>
-              <a:t>  The legend of the "Golden Oreo" is a government cover up for the existence of highly advanced spy Oreos.</a:t>
-            </a:r>
-            <a:br/>
-            <a:r>
-              <a:t>  The word "twist" in the twist and lick method is an acronym for "Transmit Wireless Intelligence Secretly Through Oreo."</a:t>
+              <a:t>  The elusive head of The Cheesemaster, known only as "Monterey Jack," is rumored to have the ability to lactate cheddar at will.</a:t>
             </a:r>
           </a:p>
           <a:p>
@@ -3364,23 +3344,39 @@
               <a:defRPr sz="1500"/>
             </a:pPr>
             <a:r>
-              <a:t>  Oreos' round shape camouflages them perfectly as surveillance discs.</a:t>
+              <a:t>  Have you ever noticed that every grilled cheese sandwich is perfectly gooey?</a:t>
             </a:r>
             <a:br/>
             <a:r>
-              <a:t>  The "O" in Oreo stands for "Observe," and the "re" is short for "record."</a:t>
+              <a:t>  Swiss cheese factories are always located near mountains, where the underground lairs of The Cheesemaster are hidden.</a:t>
             </a:r>
             <a:br/>
             <a:r>
-              <a:t>  Oreo's signature "dunkability" ensures they gather vital data from our morning coffee.</a:t>
+              <a:t>  Delivery drivers always seem to have a stash of extra cheese in their trunks.</a:t>
             </a:r>
             <a:br/>
             <a:r>
-              <a:t>  The filling contains a secret blend of nanobots that monitor our consumption habits.</a:t>
+              <a:t>  The Mouse in "Tom and Jerry" is secretly a Cheesemaster agent, ensuring that cheese is always present in our entertainment.</a:t>
             </a:r>
             <a:br/>
             <a:r>
-              <a:t>  The cookie's iconic twist design encodes cryptic messages for government agents.</a:t>
+              <a:t>  The moon landing was actually a Cheesemaster operation to secure lunar cheese resources.</a:t>
+            </a:r>
+            <a:br/>
+            <a:r>
+              <a:t>  The Great Pyramid of Giza is rumored to be a giant cheese storage facility.</a:t>
+            </a:r>
+            <a:br/>
+            <a:r>
+              <a:t>  Parmesan cheese has a mesmerizing effect on cats, proving The Cheesemaster's feline connections.</a:t>
+            </a:r>
+            <a:br/>
+            <a:r>
+              <a:t>  The Mona Lisa's enigmatic smile is a secret code for Cheesemaster members.</a:t>
+            </a:r>
+            <a:br/>
+            <a:r>
+              <a:t>  "The Godfather" was a documentary about The Cheesemaster's control over organized cheese.</a:t>
             </a:r>
           </a:p>
         </p:txBody>
@@ -3443,7 +3439,7 @@
               <a:defRPr sz="1800"/>
             </a:pPr>
             <a:r>
-              <a:t>The Oreo spyware theory alleges that the ubiquitous cookie is a covert government surveillance device. Proponents cite the Oreo's distinctive black and white color scheme as proof, claiming it resembles the yin-yang symbol used in Chinese espionage. Additionally, they point to the cookie's round shape, which they suggest allows for easy concealment in surveillance cameras. However, there is no credible evidence to support these claims. The Oreo's black and white colors are simply a reflection of its chocolate and vanilla flavors, and its round shape is a result of its production process. Furthermore, the theory fails to explain why the government would choose such a conspicuous device for its alleged espionage operations. In fact, the overwhelming majority of government surveillance is conducted through electronic devices, such as cell phones and computers, which are far more effective and less detectable than a cookie would be.</a:t>
+              <a:t>Conspiracy theorists believe that the world's cheese supply is controlled by a clandestine organization known as "The Cheesemaster." This secretive group, they claim, has infiltrated society's highest levels and manipulates cheese prices to create a monopoly. Genuine evidence of The Cheesemaster's existence includes suspiciously consistent cheese prices and the suspiciously high number of cheese-related patents. Speculation also points to the mysterious "Dairy Triangle," a region that produces an unusually high concentration of cheese. However, more dubious "evidence" includes the alleged sightings of cheese-shaped UFOs and rumors that certain celebrities are secretly Cheesemaster agents. Despite the lack of concrete proof, the "Cheesemaster" theory persists, entertaining those seeking amusement in the absurd.</a:t>
             </a:r>
           </a:p>
         </p:txBody>

</xml_diff>